<commit_message>
continue work on presentation
</commit_message>
<xml_diff>
--- a/TODO/2-Monday/Presentation1.pptx
+++ b/TODO/2-Monday/Presentation1.pptx
@@ -3213,7 +3213,6 @@
               <a:rPr lang="en-US" sz="2000" dirty="0" smtClean="0"/>
               <a:t>Use of Bitcoin is growing</a:t>
             </a:r>
-            <a:endParaRPr lang="en-US" sz="2000" dirty="0" smtClean="0"/>
           </a:p>
           <a:p>
             <a:pPr marL="285750" indent="-285750">
@@ -3235,7 +3234,6 @@
               <a:rPr lang="en-US" sz="2000" dirty="0" smtClean="0"/>
               <a:t>xchange</a:t>
             </a:r>
-            <a:endParaRPr lang="en-US" sz="2000" dirty="0" smtClean="0"/>
           </a:p>
           <a:p>
             <a:pPr marL="285750" indent="-285750">
@@ -3247,13 +3245,8 @@
             </a:pPr>
             <a:r>
               <a:rPr lang="en-US" sz="2000" dirty="0" smtClean="0"/>
-              <a:t>Exchange US Dollars for </a:t>
-            </a:r>
-            <a:r>
-              <a:rPr lang="en-US" sz="2000" dirty="0" smtClean="0"/>
-              <a:t>Bitcoin</a:t>
-            </a:r>
-            <a:endParaRPr lang="en-US" sz="2000" dirty="0" smtClean="0"/>
+              <a:t>Exchange US Dollars for Bitcoin</a:t>
+            </a:r>
           </a:p>
         </p:txBody>
       </p:sp>
@@ -3381,11 +3374,7 @@
             </a:pPr>
             <a:r>
               <a:rPr lang="en-US" sz="2400" b="1" dirty="0" smtClean="0"/>
-              <a:t>Social </a:t>
-            </a:r>
-            <a:r>
-              <a:rPr lang="en-US" sz="2400" b="1" dirty="0" smtClean="0"/>
-              <a:t>Media</a:t>
+              <a:t>Social Media</a:t>
             </a:r>
           </a:p>
           <a:p>
@@ -3502,11 +3491,7 @@
             </a:pPr>
             <a:r>
               <a:rPr lang="en-US" sz="2400" b="1" dirty="0" smtClean="0"/>
-              <a:t>Print </a:t>
-            </a:r>
-            <a:r>
-              <a:rPr lang="en-US" sz="2400" b="1" dirty="0" smtClean="0"/>
-              <a:t>campaigns</a:t>
+              <a:t>Print campaigns</a:t>
             </a:r>
           </a:p>
           <a:p>
@@ -4078,21 +4063,82 @@
           </a:p>
         </p:txBody>
       </p:sp>
-      <p:sp>
-        <p:nvSpPr>
-          <p:cNvPr id="3" name="TextBox 2"/>
-          <p:cNvSpPr txBox="1"/>
+      <p:pic>
+        <p:nvPicPr>
+          <p:cNvPr id="1027" name="Picture 3"/>
+          <p:cNvPicPr>
+            <a:picLocks noChangeAspect="1" noChangeArrowheads="1"/>
+          </p:cNvPicPr>
           <p:nvPr/>
-        </p:nvSpPr>
-        <p:spPr>
-          <a:xfrm>
-            <a:off x="762000" y="2514600"/>
-            <a:ext cx="663964" cy="369332"/>
+        </p:nvPicPr>
+        <p:blipFill>
+          <a:blip r:embed="rId2">
+            <a:extLst>
+              <a:ext uri="{28A0092B-C50C-407E-A947-70E740481C1C}">
+                <a14:useLocalDpi xmlns:a14="http://schemas.microsoft.com/office/drawing/2010/main" val="0"/>
+              </a:ext>
+            </a:extLst>
+          </a:blip>
+          <a:srcRect/>
+          <a:stretch>
+            <a:fillRect/>
+          </a:stretch>
+        </p:blipFill>
+        <p:spPr bwMode="auto">
+          <a:xfrm>
+            <a:off x="990600" y="1866900"/>
+            <a:ext cx="3048000" cy="4165600"/>
           </a:xfrm>
           <a:prstGeom prst="rect">
             <a:avLst/>
           </a:prstGeom>
           <a:noFill/>
+          <a:ln>
+            <a:noFill/>
+          </a:ln>
+          <a:effectLst>
+            <a:outerShdw blurRad="50800" dist="38100" dir="2700000" algn="tl" rotWithShape="0">
+              <a:prstClr val="black">
+                <a:alpha val="40000"/>
+              </a:prstClr>
+            </a:outerShdw>
+          </a:effectLst>
+          <a:extLst>
+            <a:ext uri="{909E8E84-426E-40DD-AFC4-6F175D3DCCD1}">
+              <a14:hiddenFill xmlns:a14="http://schemas.microsoft.com/office/drawing/2010/main">
+                <a:solidFill>
+                  <a:schemeClr val="accent1"/>
+                </a:solidFill>
+              </a14:hiddenFill>
+            </a:ext>
+            <a:ext uri="{91240B29-F687-4F45-9708-019B960494DF}">
+              <a14:hiddenLine xmlns:a14="http://schemas.microsoft.com/office/drawing/2010/main" w="9525">
+                <a:solidFill>
+                  <a:schemeClr val="tx1"/>
+                </a:solidFill>
+                <a:miter lim="800000"/>
+                <a:headEnd/>
+                <a:tailEnd/>
+              </a14:hiddenLine>
+            </a:ext>
+          </a:extLst>
+        </p:spPr>
+      </p:pic>
+      <p:sp>
+        <p:nvSpPr>
+          <p:cNvPr id="2" name="TextBox 1"/>
+          <p:cNvSpPr txBox="1"/>
+          <p:nvPr/>
+        </p:nvSpPr>
+        <p:spPr>
+          <a:xfrm>
+            <a:off x="6096000" y="2209800"/>
+            <a:ext cx="1446230" cy="1477328"/>
+          </a:xfrm>
+          <a:prstGeom prst="rect">
+            <a:avLst/>
+          </a:prstGeom>
+          <a:noFill/>
         </p:spPr>
         <p:txBody>
           <a:bodyPr wrap="none" rtlCol="0">
@@ -4100,11 +4146,88 @@
           </a:bodyPr>
           <a:lstStyle/>
           <a:p>
-            <a:r>
-              <a:rPr lang="en-US" dirty="0" smtClean="0"/>
-              <a:t>P &amp; L</a:t>
-            </a:r>
-            <a:endParaRPr lang="en-US" dirty="0"/>
+            <a:pPr>
+              <a:lnSpc>
+                <a:spcPct val="150000"/>
+              </a:lnSpc>
+            </a:pPr>
+            <a:r>
+              <a:rPr lang="en-US" sz="2000" b="1" dirty="0" smtClean="0"/>
+              <a:t>Loan</a:t>
+            </a:r>
+          </a:p>
+          <a:p>
+            <a:pPr marL="285750" indent="-285750">
+              <a:lnSpc>
+                <a:spcPct val="150000"/>
+              </a:lnSpc>
+              <a:buFont typeface="Arial" panose="020B0604020202020204" pitchFamily="34" charset="0"/>
+              <a:buChar char="•"/>
+            </a:pPr>
+            <a:r>
+              <a:rPr lang="en-US" sz="2000" dirty="0" smtClean="0"/>
+              <a:t>$500,000</a:t>
+            </a:r>
+          </a:p>
+          <a:p>
+            <a:pPr marL="285750" indent="-285750">
+              <a:lnSpc>
+                <a:spcPct val="150000"/>
+              </a:lnSpc>
+              <a:buFont typeface="Arial" panose="020B0604020202020204" pitchFamily="34" charset="0"/>
+              <a:buChar char="•"/>
+            </a:pPr>
+            <a:r>
+              <a:rPr lang="en-US" sz="2000" dirty="0" smtClean="0"/>
+              <a:t>10 year</a:t>
+            </a:r>
+          </a:p>
+        </p:txBody>
+      </p:sp>
+      <p:sp>
+        <p:nvSpPr>
+          <p:cNvPr id="7" name="TextBox 6"/>
+          <p:cNvSpPr txBox="1"/>
+          <p:nvPr/>
+        </p:nvSpPr>
+        <p:spPr>
+          <a:xfrm>
+            <a:off x="6786336" y="4572000"/>
+            <a:ext cx="1075872" cy="1015663"/>
+          </a:xfrm>
+          <a:prstGeom prst="rect">
+            <a:avLst/>
+          </a:prstGeom>
+          <a:noFill/>
+        </p:spPr>
+        <p:txBody>
+          <a:bodyPr wrap="none" rtlCol="0">
+            <a:spAutoFit/>
+          </a:bodyPr>
+          <a:lstStyle/>
+          <a:p>
+            <a:pPr>
+              <a:lnSpc>
+                <a:spcPct val="150000"/>
+              </a:lnSpc>
+            </a:pPr>
+            <a:r>
+              <a:rPr lang="en-US" sz="2000" b="1" dirty="0" smtClean="0"/>
+              <a:t>Tax Rate</a:t>
+            </a:r>
+          </a:p>
+          <a:p>
+            <a:pPr marL="285750" indent="-285750">
+              <a:lnSpc>
+                <a:spcPct val="150000"/>
+              </a:lnSpc>
+              <a:buFont typeface="Arial" panose="020B0604020202020204" pitchFamily="34" charset="0"/>
+              <a:buChar char="•"/>
+            </a:pPr>
+            <a:r>
+              <a:rPr lang="en-US" sz="2000" dirty="0" smtClean="0"/>
+              <a:t>34%</a:t>
+            </a:r>
           </a:p>
         </p:txBody>
       </p:sp>
@@ -4146,8 +4269,8 @@
         </p:nvSpPr>
         <p:spPr>
           <a:xfrm>
-            <a:off x="928548" y="762000"/>
-            <a:ext cx="5791200" cy="1143070"/>
+            <a:off x="838200" y="1619071"/>
+            <a:ext cx="3429000" cy="1200329"/>
           </a:xfrm>
           <a:prstGeom prst="rect">
             <a:avLst/>
@@ -4171,15 +4294,7 @@
             </a:r>
             <a:r>
               <a:rPr lang="en-US" sz="2400" dirty="0" smtClean="0"/>
-              <a:t>hat </a:t>
-            </a:r>
-            <a:r>
-              <a:rPr lang="en-US" sz="2400" dirty="0" smtClean="0"/>
-              <a:t>we </a:t>
-            </a:r>
-            <a:r>
-              <a:rPr lang="en-US" sz="2400" dirty="0" smtClean="0"/>
-              <a:t>need</a:t>
+              <a:t>hat we need</a:t>
             </a:r>
           </a:p>
           <a:p>
@@ -4206,7 +4321,7 @@
         </p:nvSpPr>
         <p:spPr>
           <a:xfrm>
-            <a:off x="904485" y="4876800"/>
+            <a:off x="980685" y="4724330"/>
             <a:ext cx="3362715" cy="1143070"/>
           </a:xfrm>
           <a:prstGeom prst="rect">
@@ -4227,11 +4342,7 @@
             </a:pPr>
             <a:r>
               <a:rPr lang="en-US" sz="2400" dirty="0" smtClean="0"/>
-              <a:t>Will </a:t>
-            </a:r>
-            <a:r>
-              <a:rPr lang="en-US" sz="2400" dirty="0" smtClean="0"/>
-              <a:t>we offer</a:t>
+              <a:t>Will we offer</a:t>
             </a:r>
           </a:p>
           <a:p>
@@ -4244,15 +4355,7 @@
             </a:pPr>
             <a:r>
               <a:rPr lang="en-US" sz="2400" dirty="0" smtClean="0"/>
-              <a:t>O</a:t>
-            </a:r>
-            <a:r>
-              <a:rPr lang="en-US" sz="2400" dirty="0" smtClean="0"/>
-              <a:t>wnership </a:t>
-            </a:r>
-            <a:r>
-              <a:rPr lang="en-US" sz="2400" dirty="0" smtClean="0"/>
-              <a:t>of company</a:t>
+              <a:t>Ownership of company</a:t>
             </a:r>
             <a:endParaRPr lang="en-US" sz="2400" dirty="0"/>
           </a:p>
@@ -4266,7 +4369,7 @@
         </p:nvSpPr>
         <p:spPr>
           <a:xfrm>
-            <a:off x="4876800" y="1828870"/>
+            <a:off x="4948137" y="2263676"/>
             <a:ext cx="3510063" cy="2308324"/>
           </a:xfrm>
           <a:prstGeom prst="rect">
@@ -4336,6 +4439,37 @@
               <a:rPr lang="en-US" sz="2400" dirty="0" smtClean="0"/>
               <a:t>acquire BitLincense</a:t>
             </a:r>
+          </a:p>
+        </p:txBody>
+      </p:sp>
+      <p:sp>
+        <p:nvSpPr>
+          <p:cNvPr id="6" name="TextBox 5"/>
+          <p:cNvSpPr txBox="1"/>
+          <p:nvPr/>
+        </p:nvSpPr>
+        <p:spPr>
+          <a:xfrm>
+            <a:off x="0" y="609600"/>
+            <a:ext cx="9144000" cy="707886"/>
+          </a:xfrm>
+          <a:prstGeom prst="rect">
+            <a:avLst/>
+          </a:prstGeom>
+          <a:noFill/>
+        </p:spPr>
+        <p:txBody>
+          <a:bodyPr wrap="square" rtlCol="0">
+            <a:spAutoFit/>
+          </a:bodyPr>
+          <a:lstStyle/>
+          <a:p>
+            <a:pPr algn="ctr"/>
+            <a:r>
+              <a:rPr lang="en-US" sz="4000" dirty="0" smtClean="0"/>
+              <a:t>Help</a:t>
+            </a:r>
+            <a:endParaRPr lang="en-US" sz="4000" dirty="0"/>
           </a:p>
         </p:txBody>
       </p:sp>
@@ -4394,11 +4528,7 @@
             <a:pPr algn="ctr"/>
             <a:r>
               <a:rPr lang="en-US" sz="4000" dirty="0" smtClean="0"/>
-              <a:t>Exit </a:t>
-            </a:r>
-            <a:r>
-              <a:rPr lang="en-US" sz="4000" dirty="0" smtClean="0"/>
-              <a:t>Plan</a:t>
+              <a:t>Exit Plan</a:t>
             </a:r>
             <a:endParaRPr lang="en-US" sz="4000" dirty="0"/>
           </a:p>
@@ -4412,8 +4542,8 @@
         </p:nvSpPr>
         <p:spPr>
           <a:xfrm>
-            <a:off x="2438400" y="4191000"/>
-            <a:ext cx="5107809" cy="2031325"/>
+            <a:off x="2736657" y="3483408"/>
+            <a:ext cx="3670685" cy="2308324"/>
           </a:xfrm>
           <a:prstGeom prst="rect">
             <a:avLst/>
@@ -4426,42 +4556,65 @@
           </a:bodyPr>
           <a:lstStyle/>
           <a:p>
-            <a:r>
-              <a:rPr lang="en-US" dirty="0" smtClean="0"/>
-              <a:t>Sell of three key assets;</a:t>
-            </a:r>
-          </a:p>
-          <a:p>
-            <a:endParaRPr lang="en-US" dirty="0"/>
-          </a:p>
-          <a:p>
-            <a:r>
-              <a:rPr lang="en-US" dirty="0" smtClean="0"/>
+            <a:pPr>
+              <a:lnSpc>
+                <a:spcPct val="150000"/>
+              </a:lnSpc>
+            </a:pPr>
+            <a:r>
+              <a:rPr lang="en-US" sz="2400" dirty="0"/>
+              <a:t>K</a:t>
+            </a:r>
+            <a:r>
+              <a:rPr lang="en-US" sz="2400" dirty="0" smtClean="0"/>
+              <a:t>ey assets the could be sold</a:t>
+            </a:r>
+            <a:endParaRPr lang="en-US" sz="2400" dirty="0" smtClean="0"/>
+          </a:p>
+          <a:p>
+            <a:pPr marL="285750" indent="-285750">
+              <a:lnSpc>
+                <a:spcPct val="150000"/>
+              </a:lnSpc>
+              <a:buFont typeface="Arial" panose="020B0604020202020204" pitchFamily="34" charset="0"/>
+              <a:buChar char="•"/>
+            </a:pPr>
+            <a:r>
+              <a:rPr lang="en-US" sz="2400" dirty="0" smtClean="0"/>
               <a:t>Customers</a:t>
             </a:r>
-          </a:p>
-          <a:p>
-            <a:endParaRPr lang="en-US" dirty="0"/>
-          </a:p>
-          <a:p>
-            <a:r>
-              <a:rPr lang="en-US" dirty="0" smtClean="0"/>
-              <a:t>Exchange software</a:t>
-            </a:r>
-          </a:p>
-          <a:p>
-            <a:endParaRPr lang="en-US" dirty="0"/>
-          </a:p>
-          <a:p>
-            <a:r>
-              <a:rPr lang="en-US" dirty="0" err="1" smtClean="0"/>
-              <a:t>Licences</a:t>
-            </a:r>
-            <a:r>
-              <a:rPr lang="en-US" dirty="0" smtClean="0"/>
-              <a:t> (as much as 100,000 in legal / account fees)</a:t>
-            </a:r>
-            <a:endParaRPr lang="en-US" dirty="0"/>
+            <a:endParaRPr lang="en-US" sz="2400" dirty="0" smtClean="0"/>
+          </a:p>
+          <a:p>
+            <a:pPr marL="285750" indent="-285750">
+              <a:lnSpc>
+                <a:spcPct val="150000"/>
+              </a:lnSpc>
+              <a:buFont typeface="Arial" panose="020B0604020202020204" pitchFamily="34" charset="0"/>
+              <a:buChar char="•"/>
+            </a:pPr>
+            <a:r>
+              <a:rPr lang="en-US" sz="2400" dirty="0" smtClean="0"/>
+              <a:t>Exchange </a:t>
+            </a:r>
+            <a:r>
+              <a:rPr lang="en-US" sz="2400" dirty="0" smtClean="0"/>
+              <a:t>software</a:t>
+            </a:r>
+          </a:p>
+          <a:p>
+            <a:pPr marL="285750" indent="-285750">
+              <a:lnSpc>
+                <a:spcPct val="150000"/>
+              </a:lnSpc>
+              <a:buFont typeface="Arial" panose="020B0604020202020204" pitchFamily="34" charset="0"/>
+              <a:buChar char="•"/>
+            </a:pPr>
+            <a:r>
+              <a:rPr lang="en-US" sz="2400" dirty="0" smtClean="0"/>
+              <a:t>BitLincense</a:t>
+            </a:r>
+            <a:endParaRPr lang="en-US" sz="2400" dirty="0"/>
           </a:p>
         </p:txBody>
       </p:sp>
@@ -4473,8 +4626,8 @@
         </p:nvSpPr>
         <p:spPr>
           <a:xfrm>
-            <a:off x="838201" y="2514600"/>
-            <a:ext cx="6477000" cy="646331"/>
+            <a:off x="609600" y="2209800"/>
+            <a:ext cx="6477000" cy="461665"/>
           </a:xfrm>
           <a:prstGeom prst="rect">
             <a:avLst/>
@@ -4488,10 +4641,14 @@
           <a:lstStyle/>
           <a:p>
             <a:r>
-              <a:rPr lang="en-US" dirty="0" smtClean="0"/>
-              <a:t>No plan to leave exchange, maintain ownership, slowly lessen daily activities involving exchange</a:t>
-            </a:r>
-            <a:endParaRPr lang="en-US" dirty="0"/>
+              <a:rPr lang="en-US" sz="2400" dirty="0" smtClean="0"/>
+              <a:t>No plan to leave </a:t>
+            </a:r>
+            <a:r>
+              <a:rPr lang="en-US" sz="2400" dirty="0" smtClean="0"/>
+              <a:t>exchange or give up ownership</a:t>
+            </a:r>
+            <a:endParaRPr lang="en-US" sz="2400" dirty="0"/>
           </a:p>
         </p:txBody>
       </p:sp>
@@ -4580,13 +4737,8 @@
           <a:p>
             <a:r>
               <a:rPr lang="en-US" sz="2000" dirty="0" smtClean="0"/>
-              <a:t>By the end of 5 years we will </a:t>
-            </a:r>
-            <a:r>
-              <a:rPr lang="en-US" sz="2000" dirty="0" smtClean="0"/>
-              <a:t>have</a:t>
-            </a:r>
-            <a:endParaRPr lang="en-US" sz="2000" dirty="0" smtClean="0"/>
+              <a:t>By the end of 5 years we will have</a:t>
+            </a:r>
           </a:p>
           <a:p>
             <a:endParaRPr lang="en-US" sz="2000" dirty="0" smtClean="0"/>
@@ -4640,13 +4792,8 @@
             </a:pPr>
             <a:r>
               <a:rPr lang="en-US" sz="2000" dirty="0" smtClean="0"/>
-              <a:t>Open </a:t>
-            </a:r>
-            <a:r>
-              <a:rPr lang="en-US" sz="2000" dirty="0" smtClean="0"/>
-              <a:t>the exchange </a:t>
-            </a:r>
-            <a:endParaRPr lang="en-US" sz="2000" dirty="0" smtClean="0"/>
+              <a:t>Open the exchange </a:t>
+            </a:r>
           </a:p>
           <a:p>
             <a:pPr marL="342900" indent="-342900">
@@ -4658,15 +4805,7 @@
             </a:pPr>
             <a:r>
               <a:rPr lang="en-US" sz="2000" dirty="0" smtClean="0"/>
-              <a:t>Maintain  at least </a:t>
-            </a:r>
-            <a:r>
-              <a:rPr lang="en-US" sz="2000" dirty="0" smtClean="0"/>
-              <a:t>5</a:t>
-            </a:r>
-            <a:r>
-              <a:rPr lang="en-US" sz="2000" dirty="0" smtClean="0"/>
-              <a:t>% total trading volume</a:t>
+              <a:t>Maintain  at least 5% total trading volume</a:t>
             </a:r>
             <a:endParaRPr lang="en-US" sz="2000" dirty="0"/>
           </a:p>
@@ -4955,13 +5094,8 @@
             </a:r>
             <a:r>
               <a:rPr lang="en-US" dirty="0" smtClean="0"/>
-              <a:t>pportunity: </a:t>
-            </a:r>
-            <a:r>
-              <a:rPr lang="en-US" dirty="0" smtClean="0"/>
-              <a:t>To Big to Fail</a:t>
-            </a:r>
-            <a:endParaRPr lang="en-US" dirty="0" smtClean="0"/>
+              <a:t>pportunity: To Big to Fail</a:t>
+            </a:r>
           </a:p>
           <a:p>
             <a:pPr marL="285750" indent="-285750">
@@ -4973,11 +5107,7 @@
             </a:pPr>
             <a:r>
               <a:rPr lang="en-US" dirty="0" smtClean="0"/>
-              <a:t>Threat: </a:t>
-            </a:r>
-            <a:r>
-              <a:rPr lang="en-US" dirty="0" smtClean="0"/>
-              <a:t>Silk Road</a:t>
+              <a:t>Threat: Silk Road</a:t>
             </a:r>
             <a:endParaRPr lang="en-US" dirty="0"/>
           </a:p>
@@ -5033,11 +5163,7 @@
             </a:r>
             <a:r>
               <a:rPr lang="en-US" dirty="0" smtClean="0"/>
-              <a:t>: Block </a:t>
-            </a:r>
-            <a:r>
-              <a:rPr lang="en-US" dirty="0" smtClean="0"/>
-              <a:t>chain</a:t>
+              <a:t>: Block chain</a:t>
             </a:r>
           </a:p>
           <a:p>
@@ -5054,11 +5180,7 @@
             </a:r>
             <a:r>
               <a:rPr lang="en-US" dirty="0" smtClean="0"/>
-              <a:t>: </a:t>
-            </a:r>
-            <a:r>
-              <a:rPr lang="en-US" dirty="0" smtClean="0"/>
-              <a:t>Hackers</a:t>
+              <a:t>: Hackers</a:t>
             </a:r>
             <a:endParaRPr lang="en-US" dirty="0"/>
           </a:p>
@@ -5110,13 +5232,8 @@
             </a:r>
             <a:r>
               <a:rPr lang="en-US" dirty="0" smtClean="0"/>
-              <a:t>:  </a:t>
-            </a:r>
-            <a:r>
-              <a:rPr lang="en-US" dirty="0" smtClean="0"/>
-              <a:t>Growth of online sales</a:t>
-            </a:r>
-            <a:endParaRPr lang="en-US" dirty="0" smtClean="0"/>
+              <a:t>:  Growth of online sales</a:t>
+            </a:r>
           </a:p>
           <a:p>
             <a:pPr marL="285750" indent="-285750">
@@ -5132,11 +5249,7 @@
             </a:r>
             <a:r>
               <a:rPr lang="en-US" dirty="0" smtClean="0"/>
-              <a:t>:  Poor </a:t>
-            </a:r>
-            <a:r>
-              <a:rPr lang="en-US" dirty="0" smtClean="0"/>
-              <a:t>economy</a:t>
+              <a:t>:  Poor economy</a:t>
             </a:r>
             <a:endParaRPr lang="en-US" dirty="0"/>
           </a:p>
@@ -5188,11 +5301,7 @@
             </a:r>
             <a:r>
               <a:rPr lang="en-US" dirty="0" smtClean="0"/>
-              <a:t>:  </a:t>
-            </a:r>
-            <a:r>
-              <a:rPr lang="en-US" dirty="0" smtClean="0"/>
-              <a:t>NYS BitLicense</a:t>
+              <a:t>:  NYS BitLicense</a:t>
             </a:r>
           </a:p>
           <a:p>
@@ -5209,11 +5318,7 @@
             </a:r>
             <a:r>
               <a:rPr lang="en-US" dirty="0" smtClean="0"/>
-              <a:t>:  </a:t>
-            </a:r>
-            <a:r>
-              <a:rPr lang="en-US" dirty="0" smtClean="0"/>
-              <a:t>Governments regulation</a:t>
+              <a:t>:  Governments regulation</a:t>
             </a:r>
             <a:endParaRPr lang="en-US" dirty="0"/>
           </a:p>
@@ -5698,11 +5803,7 @@
           <a:p>
             <a:r>
               <a:rPr lang="en-US" sz="2800" dirty="0" smtClean="0"/>
-              <a:t>People who want buy </a:t>
-            </a:r>
-            <a:r>
-              <a:rPr lang="en-US" sz="2800" dirty="0" smtClean="0"/>
-              <a:t>bitcoin</a:t>
+              <a:t>People who want buy bitcoin</a:t>
             </a:r>
           </a:p>
           <a:p>
@@ -5738,11 +5839,7 @@
           <a:p>
             <a:r>
               <a:rPr lang="en-US" sz="2800" dirty="0" smtClean="0"/>
-              <a:t>People who want to sell </a:t>
-            </a:r>
-            <a:r>
-              <a:rPr lang="en-US" sz="2800" dirty="0" smtClean="0"/>
-              <a:t>bitcoin</a:t>
+              <a:t>People who want to sell bitcoin</a:t>
             </a:r>
           </a:p>
           <a:p>
@@ -5786,11 +5883,7 @@
             </a:r>
             <a:r>
               <a:rPr lang="en-US" sz="2800" dirty="0" smtClean="0"/>
-              <a:t>raders </a:t>
-            </a:r>
-            <a:r>
-              <a:rPr lang="en-US" sz="2800" dirty="0" smtClean="0"/>
-              <a:t>looking for profit</a:t>
+              <a:t>raders looking for profit</a:t>
             </a:r>
             <a:endParaRPr lang="en-US" sz="2800" dirty="0"/>
           </a:p>
@@ -5824,11 +5917,7 @@
             </a:r>
             <a:r>
               <a:rPr lang="en-US" sz="2400" dirty="0" smtClean="0"/>
-              <a:t>  </a:t>
-            </a:r>
-            <a:r>
-              <a:rPr lang="en-US" sz="2400" dirty="0" smtClean="0"/>
-              <a:t>Attract </a:t>
+              <a:t>  Attract </a:t>
             </a:r>
             <a:r>
               <a:rPr lang="en-US" sz="2400" b="1" dirty="0" smtClean="0"/>
@@ -6018,7 +6107,6 @@
               <a:rPr lang="en-US" sz="2400" dirty="0" smtClean="0"/>
               <a:t>API</a:t>
             </a:r>
-            <a:endParaRPr lang="en-US" sz="2400" dirty="0" smtClean="0"/>
           </a:p>
           <a:p>
             <a:pPr marL="285750" indent="-285750">
@@ -6147,11 +6235,7 @@
             </a:pPr>
             <a:r>
               <a:rPr lang="en-US" sz="2400" b="1" dirty="0" smtClean="0"/>
-              <a:t>Direct </a:t>
-            </a:r>
-            <a:r>
-              <a:rPr lang="en-US" sz="2400" b="1" dirty="0" smtClean="0"/>
-              <a:t>Channel </a:t>
+              <a:t>Direct Channel </a:t>
             </a:r>
             <a:r>
               <a:rPr lang="en-US" sz="2400" b="1" dirty="0"/>

</xml_diff>